<commit_message>
main xml, login xml
</commit_message>
<xml_diff>
--- a/AppJam.pptx
+++ b/AppJam.pptx
@@ -291,6 +291,7 @@
           <a:p>
             <a:fld id="{BEBF8046-50F1-4F8D-BD23-59F4D43B9D17}" type="datetimeFigureOut">
               <a:rPr lang="ko-KR" altLang="en-US" smtClean="0"/>
+              <a:pPr/>
               <a:t>2015-12-19</a:t>
             </a:fld>
             <a:endParaRPr lang="ko-KR" altLang="en-US"/>
@@ -333,6 +334,7 @@
           <a:p>
             <a:fld id="{17B50768-A66A-44D1-9BAA-BEDEFCD2C5C1}" type="slidenum">
               <a:rPr lang="ko-KR" altLang="en-US" smtClean="0"/>
+              <a:pPr/>
               <a:t>‹#›</a:t>
             </a:fld>
             <a:endParaRPr lang="ko-KR" altLang="en-US"/>
@@ -456,6 +458,7 @@
           <a:p>
             <a:fld id="{BEBF8046-50F1-4F8D-BD23-59F4D43B9D17}" type="datetimeFigureOut">
               <a:rPr lang="ko-KR" altLang="en-US" smtClean="0"/>
+              <a:pPr/>
               <a:t>2015-12-19</a:t>
             </a:fld>
             <a:endParaRPr lang="ko-KR" altLang="en-US"/>
@@ -498,6 +501,7 @@
           <a:p>
             <a:fld id="{17B50768-A66A-44D1-9BAA-BEDEFCD2C5C1}" type="slidenum">
               <a:rPr lang="ko-KR" altLang="en-US" smtClean="0"/>
+              <a:pPr/>
               <a:t>‹#›</a:t>
             </a:fld>
             <a:endParaRPr lang="ko-KR" altLang="en-US"/>
@@ -631,6 +635,7 @@
           <a:p>
             <a:fld id="{BEBF8046-50F1-4F8D-BD23-59F4D43B9D17}" type="datetimeFigureOut">
               <a:rPr lang="ko-KR" altLang="en-US" smtClean="0"/>
+              <a:pPr/>
               <a:t>2015-12-19</a:t>
             </a:fld>
             <a:endParaRPr lang="ko-KR" altLang="en-US"/>
@@ -673,6 +678,7 @@
           <a:p>
             <a:fld id="{17B50768-A66A-44D1-9BAA-BEDEFCD2C5C1}" type="slidenum">
               <a:rPr lang="ko-KR" altLang="en-US" smtClean="0"/>
+              <a:pPr/>
               <a:t>‹#›</a:t>
             </a:fld>
             <a:endParaRPr lang="ko-KR" altLang="en-US"/>
@@ -796,6 +802,7 @@
           <a:p>
             <a:fld id="{BEBF8046-50F1-4F8D-BD23-59F4D43B9D17}" type="datetimeFigureOut">
               <a:rPr lang="ko-KR" altLang="en-US" smtClean="0"/>
+              <a:pPr/>
               <a:t>2015-12-19</a:t>
             </a:fld>
             <a:endParaRPr lang="ko-KR" altLang="en-US"/>
@@ -838,6 +845,7 @@
           <a:p>
             <a:fld id="{17B50768-A66A-44D1-9BAA-BEDEFCD2C5C1}" type="slidenum">
               <a:rPr lang="ko-KR" altLang="en-US" smtClean="0"/>
+              <a:pPr/>
               <a:t>‹#›</a:t>
             </a:fld>
             <a:endParaRPr lang="ko-KR" altLang="en-US"/>
@@ -1037,6 +1045,7 @@
           <a:p>
             <a:fld id="{BEBF8046-50F1-4F8D-BD23-59F4D43B9D17}" type="datetimeFigureOut">
               <a:rPr lang="ko-KR" altLang="en-US" smtClean="0"/>
+              <a:pPr/>
               <a:t>2015-12-19</a:t>
             </a:fld>
             <a:endParaRPr lang="ko-KR" altLang="en-US"/>
@@ -1079,6 +1088,7 @@
           <a:p>
             <a:fld id="{17B50768-A66A-44D1-9BAA-BEDEFCD2C5C1}" type="slidenum">
               <a:rPr lang="ko-KR" altLang="en-US" smtClean="0"/>
+              <a:pPr/>
               <a:t>‹#›</a:t>
             </a:fld>
             <a:endParaRPr lang="ko-KR" altLang="en-US"/>
@@ -1320,6 +1330,7 @@
           <a:p>
             <a:fld id="{BEBF8046-50F1-4F8D-BD23-59F4D43B9D17}" type="datetimeFigureOut">
               <a:rPr lang="ko-KR" altLang="en-US" smtClean="0"/>
+              <a:pPr/>
               <a:t>2015-12-19</a:t>
             </a:fld>
             <a:endParaRPr lang="ko-KR" altLang="en-US"/>
@@ -1362,6 +1373,7 @@
           <a:p>
             <a:fld id="{17B50768-A66A-44D1-9BAA-BEDEFCD2C5C1}" type="slidenum">
               <a:rPr lang="ko-KR" altLang="en-US" smtClean="0"/>
+              <a:pPr/>
               <a:t>‹#›</a:t>
             </a:fld>
             <a:endParaRPr lang="ko-KR" altLang="en-US"/>
@@ -1742,6 +1754,7 @@
           <a:p>
             <a:fld id="{BEBF8046-50F1-4F8D-BD23-59F4D43B9D17}" type="datetimeFigureOut">
               <a:rPr lang="ko-KR" altLang="en-US" smtClean="0"/>
+              <a:pPr/>
               <a:t>2015-12-19</a:t>
             </a:fld>
             <a:endParaRPr lang="ko-KR" altLang="en-US"/>
@@ -1784,6 +1797,7 @@
           <a:p>
             <a:fld id="{17B50768-A66A-44D1-9BAA-BEDEFCD2C5C1}" type="slidenum">
               <a:rPr lang="ko-KR" altLang="en-US" smtClean="0"/>
+              <a:pPr/>
               <a:t>‹#›</a:t>
             </a:fld>
             <a:endParaRPr lang="ko-KR" altLang="en-US"/>
@@ -1855,6 +1869,7 @@
           <a:p>
             <a:fld id="{BEBF8046-50F1-4F8D-BD23-59F4D43B9D17}" type="datetimeFigureOut">
               <a:rPr lang="ko-KR" altLang="en-US" smtClean="0"/>
+              <a:pPr/>
               <a:t>2015-12-19</a:t>
             </a:fld>
             <a:endParaRPr lang="ko-KR" altLang="en-US"/>
@@ -1897,6 +1912,7 @@
           <a:p>
             <a:fld id="{17B50768-A66A-44D1-9BAA-BEDEFCD2C5C1}" type="slidenum">
               <a:rPr lang="ko-KR" altLang="en-US" smtClean="0"/>
+              <a:pPr/>
               <a:t>‹#›</a:t>
             </a:fld>
             <a:endParaRPr lang="ko-KR" altLang="en-US"/>
@@ -1945,6 +1961,7 @@
           <a:p>
             <a:fld id="{BEBF8046-50F1-4F8D-BD23-59F4D43B9D17}" type="datetimeFigureOut">
               <a:rPr lang="ko-KR" altLang="en-US" smtClean="0"/>
+              <a:pPr/>
               <a:t>2015-12-19</a:t>
             </a:fld>
             <a:endParaRPr lang="ko-KR" altLang="en-US"/>
@@ -1987,6 +2004,7 @@
           <a:p>
             <a:fld id="{17B50768-A66A-44D1-9BAA-BEDEFCD2C5C1}" type="slidenum">
               <a:rPr lang="ko-KR" altLang="en-US" smtClean="0"/>
+              <a:pPr/>
               <a:t>‹#›</a:t>
             </a:fld>
             <a:endParaRPr lang="ko-KR" altLang="en-US"/>
@@ -2217,6 +2235,7 @@
           <a:p>
             <a:fld id="{BEBF8046-50F1-4F8D-BD23-59F4D43B9D17}" type="datetimeFigureOut">
               <a:rPr lang="ko-KR" altLang="en-US" smtClean="0"/>
+              <a:pPr/>
               <a:t>2015-12-19</a:t>
             </a:fld>
             <a:endParaRPr lang="ko-KR" altLang="en-US"/>
@@ -2259,6 +2278,7 @@
           <a:p>
             <a:fld id="{17B50768-A66A-44D1-9BAA-BEDEFCD2C5C1}" type="slidenum">
               <a:rPr lang="ko-KR" altLang="en-US" smtClean="0"/>
+              <a:pPr/>
               <a:t>‹#›</a:t>
             </a:fld>
             <a:endParaRPr lang="ko-KR" altLang="en-US"/>
@@ -2465,6 +2485,7 @@
           <a:p>
             <a:fld id="{BEBF8046-50F1-4F8D-BD23-59F4D43B9D17}" type="datetimeFigureOut">
               <a:rPr lang="ko-KR" altLang="en-US" smtClean="0"/>
+              <a:pPr/>
               <a:t>2015-12-19</a:t>
             </a:fld>
             <a:endParaRPr lang="ko-KR" altLang="en-US"/>
@@ -2507,6 +2528,7 @@
           <a:p>
             <a:fld id="{17B50768-A66A-44D1-9BAA-BEDEFCD2C5C1}" type="slidenum">
               <a:rPr lang="ko-KR" altLang="en-US" smtClean="0"/>
+              <a:pPr/>
               <a:t>‹#›</a:t>
             </a:fld>
             <a:endParaRPr lang="ko-KR" altLang="en-US"/>
@@ -2673,6 +2695,7 @@
           <a:p>
             <a:fld id="{BEBF8046-50F1-4F8D-BD23-59F4D43B9D17}" type="datetimeFigureOut">
               <a:rPr lang="ko-KR" altLang="en-US" smtClean="0"/>
+              <a:pPr/>
               <a:t>2015-12-19</a:t>
             </a:fld>
             <a:endParaRPr lang="ko-KR" altLang="en-US"/>
@@ -2751,6 +2774,7 @@
           <a:p>
             <a:fld id="{17B50768-A66A-44D1-9BAA-BEDEFCD2C5C1}" type="slidenum">
               <a:rPr lang="ko-KR" altLang="en-US" smtClean="0"/>
+              <a:pPr/>
               <a:t>‹#›</a:t>
             </a:fld>
             <a:endParaRPr lang="ko-KR" altLang="en-US"/>
@@ -4080,6 +4104,36 @@
           </p:txBody>
         </p:sp>
       </p:grpSp>
+      <p:sp>
+        <p:nvSpPr>
+          <p:cNvPr id="23" name="TextBox 22"/>
+          <p:cNvSpPr txBox="1"/>
+          <p:nvPr/>
+        </p:nvSpPr>
+        <p:spPr>
+          <a:xfrm>
+            <a:off x="1280592" y="6237312"/>
+            <a:ext cx="1521570" cy="369332"/>
+          </a:xfrm>
+          <a:prstGeom prst="rect">
+            <a:avLst/>
+          </a:prstGeom>
+          <a:noFill/>
+        </p:spPr>
+        <p:txBody>
+          <a:bodyPr wrap="none" rtlCol="0">
+            <a:spAutoFit/>
+          </a:bodyPr>
+          <a:lstStyle/>
+          <a:p>
+            <a:r>
+              <a:rPr lang="en-US" altLang="ko-KR" dirty="0" err="1" smtClean="0"/>
+              <a:t>LoginActivity</a:t>
+            </a:r>
+            <a:endParaRPr lang="ko-KR" altLang="en-US" dirty="0"/>
+          </a:p>
+        </p:txBody>
+      </p:sp>
     </p:spTree>
   </p:cSld>
   <p:clrMapOvr>

</xml_diff>